<commit_message>
Simplified Presentations 1 and 2
</commit_message>
<xml_diff>
--- a/powerpoint/01 Variables_Operators_Logic_Math.pptx
+++ b/powerpoint/01 Variables_Operators_Logic_Math.pptx
@@ -474,7 +474,7 @@
           <a:p>
             <a:fld id="{9819AC5B-5C28-4682-8A2A-3D2C4E3BE131}" type="datetimeFigureOut">
               <a:rPr lang="en-US" smtClean="0"/>
-              <a:t>6/8/2018</a:t>
+              <a:t>6/11/2018</a:t>
             </a:fld>
             <a:endParaRPr lang="en-US"/>
           </a:p>
@@ -682,7 +682,7 @@
           <a:p>
             <a:fld id="{9819AC5B-5C28-4682-8A2A-3D2C4E3BE131}" type="datetimeFigureOut">
               <a:rPr lang="en-US" smtClean="0"/>
-              <a:t>6/8/2018</a:t>
+              <a:t>6/11/2018</a:t>
             </a:fld>
             <a:endParaRPr lang="en-US"/>
           </a:p>
@@ -1136,7 +1136,7 @@
           <a:p>
             <a:fld id="{9819AC5B-5C28-4682-8A2A-3D2C4E3BE131}" type="datetimeFigureOut">
               <a:rPr lang="en-US" smtClean="0"/>
-              <a:t>6/8/2018</a:t>
+              <a:t>6/11/2018</a:t>
             </a:fld>
             <a:endParaRPr lang="en-US"/>
           </a:p>
@@ -1401,7 +1401,7 @@
           <a:p>
             <a:fld id="{9819AC5B-5C28-4682-8A2A-3D2C4E3BE131}" type="datetimeFigureOut">
               <a:rPr lang="en-US" smtClean="0"/>
-              <a:t>6/8/2018</a:t>
+              <a:t>6/11/2018</a:t>
             </a:fld>
             <a:endParaRPr lang="en-US"/>
           </a:p>
@@ -1813,7 +1813,7 @@
           <a:p>
             <a:fld id="{9819AC5B-5C28-4682-8A2A-3D2C4E3BE131}" type="datetimeFigureOut">
               <a:rPr lang="en-US" smtClean="0"/>
-              <a:t>6/8/2018</a:t>
+              <a:t>6/11/2018</a:t>
             </a:fld>
             <a:endParaRPr lang="en-US"/>
           </a:p>
@@ -1954,7 +1954,7 @@
           <a:p>
             <a:fld id="{9819AC5B-5C28-4682-8A2A-3D2C4E3BE131}" type="datetimeFigureOut">
               <a:rPr lang="en-US" smtClean="0"/>
-              <a:t>6/8/2018</a:t>
+              <a:t>6/11/2018</a:t>
             </a:fld>
             <a:endParaRPr lang="en-US"/>
           </a:p>
@@ -2067,7 +2067,7 @@
           <a:p>
             <a:fld id="{9819AC5B-5C28-4682-8A2A-3D2C4E3BE131}" type="datetimeFigureOut">
               <a:rPr lang="en-US" smtClean="0"/>
-              <a:t>6/8/2018</a:t>
+              <a:t>6/11/2018</a:t>
             </a:fld>
             <a:endParaRPr lang="en-US"/>
           </a:p>
@@ -2378,7 +2378,7 @@
           <a:p>
             <a:fld id="{9819AC5B-5C28-4682-8A2A-3D2C4E3BE131}" type="datetimeFigureOut">
               <a:rPr lang="en-US" smtClean="0"/>
-              <a:t>6/8/2018</a:t>
+              <a:t>6/11/2018</a:t>
             </a:fld>
             <a:endParaRPr lang="en-US"/>
           </a:p>
@@ -2666,7 +2666,7 @@
           <a:p>
             <a:fld id="{9819AC5B-5C28-4682-8A2A-3D2C4E3BE131}" type="datetimeFigureOut">
               <a:rPr lang="en-US" smtClean="0"/>
-              <a:t>6/8/2018</a:t>
+              <a:t>6/11/2018</a:t>
             </a:fld>
             <a:endParaRPr lang="en-US"/>
           </a:p>
@@ -2907,7 +2907,7 @@
           <a:p>
             <a:fld id="{9819AC5B-5C28-4682-8A2A-3D2C4E3BE131}" type="datetimeFigureOut">
               <a:rPr lang="en-US" smtClean="0"/>
-              <a:t>6/8/2018</a:t>
+              <a:t>6/11/2018</a:t>
             </a:fld>
             <a:endParaRPr lang="en-US"/>
           </a:p>
@@ -3531,7 +3531,7 @@
                 <a:latin typeface="Lucida Sans Typewriter" panose="020B0509030504030204" pitchFamily="49" charset="0"/>
                 <a:ea typeface="ＭＳ Ｐゴシック" panose="020B0600070205080204" pitchFamily="34" charset="-128"/>
               </a:rPr>
-              <a:t> 	bob  </a:t>
+              <a:t> 	</a:t>
             </a:r>
             <a:r>
               <a:rPr lang="en-US" altLang="en-US" sz="1200" dirty="0" err="1">
@@ -3541,7 +3541,7 @@
                 <a:latin typeface="Lucida Sans Typewriter" panose="020B0509030504030204" pitchFamily="49" charset="0"/>
                 <a:ea typeface="ＭＳ Ｐゴシック" panose="020B0600070205080204" pitchFamily="34" charset="-128"/>
               </a:rPr>
-              <a:t>Bob</a:t>
+              <a:t>first_name</a:t>
             </a:r>
             <a:r>
               <a:rPr lang="en-US" altLang="en-US" sz="1200" dirty="0">
@@ -3551,7 +3551,7 @@
                 <a:latin typeface="Lucida Sans Typewriter" panose="020B0509030504030204" pitchFamily="49" charset="0"/>
                 <a:ea typeface="ＭＳ Ｐゴシック" panose="020B0600070205080204" pitchFamily="34" charset="-128"/>
               </a:rPr>
-              <a:t>  _bob  _2_bob_  bob_2  </a:t>
+              <a:t> </a:t>
             </a:r>
             <a:r>
               <a:rPr lang="en-US" altLang="en-US" sz="1200" dirty="0" err="1">
@@ -3561,8 +3561,29 @@
                 <a:latin typeface="Lucida Sans Typewriter" panose="020B0509030504030204" pitchFamily="49" charset="0"/>
                 <a:ea typeface="ＭＳ Ｐゴシック" panose="020B0600070205080204" pitchFamily="34" charset="-128"/>
               </a:rPr>
-              <a:t>BoB</a:t>
-            </a:r>
+              <a:t>firstname</a:t>
+            </a:r>
+            <a:r>
+              <a:rPr lang="en-US" altLang="en-US" sz="1200" dirty="0">
+                <a:solidFill>
+                  <a:schemeClr val="accent2"/>
+                </a:solidFill>
+                <a:latin typeface="Lucida Sans Typewriter" panose="020B0509030504030204" pitchFamily="49" charset="0"/>
+                <a:ea typeface="ＭＳ Ｐゴシック" panose="020B0600070205080204" pitchFamily="34" charset="-128"/>
+              </a:rPr>
+              <a:t>  FirstName _FirstName Name_1st</a:t>
+            </a:r>
+          </a:p>
+          <a:p>
+            <a:pPr marL="0" lvl="1" indent="0">
+              <a:lnSpc>
+                <a:spcPct val="70000"/>
+              </a:lnSpc>
+              <a:spcBef>
+                <a:spcPts val="1000"/>
+              </a:spcBef>
+              <a:buNone/>
+            </a:pPr>
             <a:endParaRPr lang="en-US" altLang="en-US" sz="1200" dirty="0">
               <a:solidFill>
                 <a:schemeClr val="accent2"/>
@@ -3572,29 +3593,23 @@
             </a:endParaRPr>
           </a:p>
           <a:p>
-            <a:pPr marL="0" lvl="1" indent="0">
-              <a:lnSpc>
-                <a:spcPct val="70000"/>
-              </a:lnSpc>
-              <a:spcBef>
-                <a:spcPts val="1000"/>
-              </a:spcBef>
-              <a:buNone/>
-            </a:pPr>
-            <a:endParaRPr lang="en-US" altLang="en-US" sz="1200" dirty="0">
-              <a:solidFill>
-                <a:schemeClr val="accent2"/>
-              </a:solidFill>
-              <a:latin typeface="Lucida Sans Typewriter" panose="020B0509030504030204" pitchFamily="49" charset="0"/>
-              <a:ea typeface="ＭＳ Ｐゴシック" panose="020B0600070205080204" pitchFamily="34" charset="-128"/>
-            </a:endParaRPr>
-          </a:p>
-          <a:p>
             <a:r>
               <a:rPr lang="en-US" altLang="en-US" dirty="0">
                 <a:ea typeface="ＭＳ Ｐゴシック" panose="020B0600070205080204" pitchFamily="34" charset="-128"/>
               </a:rPr>
-              <a:t>These are Python’s reserved words:</a:t>
+              <a:t>These are Python’s </a:t>
+            </a:r>
+            <a:r>
+              <a:rPr lang="en-US" altLang="en-US" i="1" dirty="0">
+                <a:ea typeface="ＭＳ Ｐゴシック" panose="020B0600070205080204" pitchFamily="34" charset="-128"/>
+              </a:rPr>
+              <a:t>reserved words</a:t>
+            </a:r>
+            <a:r>
+              <a:rPr lang="en-US" altLang="en-US" dirty="0">
+                <a:ea typeface="ＭＳ Ｐゴシック" panose="020B0600070205080204" pitchFamily="34" charset="-128"/>
+              </a:rPr>
+              <a:t>:</a:t>
             </a:r>
           </a:p>
           <a:p>
@@ -4399,7 +4414,7 @@
         <p:spPr>
           <a:xfrm>
             <a:off x="838200" y="2043738"/>
-            <a:ext cx="10515600" cy="3895667"/>
+            <a:ext cx="10515600" cy="4222838"/>
           </a:xfrm>
         </p:spPr>
         <p:txBody>
@@ -4415,43 +4430,16 @@
               <a:buNone/>
             </a:pPr>
             <a:r>
+              <a:rPr lang="en-US" altLang="en-US" sz="5500" b="1" dirty="0">
+                <a:ea typeface="ＭＳ Ｐゴシック" panose="020B0600070205080204" pitchFamily="34" charset="-128"/>
+              </a:rPr>
+              <a:t>Exercise</a:t>
+            </a:r>
+            <a:r>
               <a:rPr lang="en-US" altLang="en-US" sz="5500" dirty="0">
-                <a:solidFill>
-                  <a:schemeClr val="accent2"/>
-                </a:solidFill>
-                <a:latin typeface="Lucida Sans Typewriter" panose="020B0509030504030204" pitchFamily="49" charset="0"/>
-                <a:ea typeface="ＭＳ Ｐゴシック" panose="020B0600070205080204" pitchFamily="34" charset="-128"/>
-              </a:rPr>
-              <a:t>** </a:t>
-            </a:r>
-            <a:r>
-              <a:rPr lang="en-US" altLang="en-US" sz="5500" dirty="0">
-                <a:latin typeface="Courier New" panose="02070309020205020404" pitchFamily="49" charset="0"/>
-                <a:ea typeface="ＭＳ Ｐゴシック" panose="020B0600070205080204" pitchFamily="34" charset="-128"/>
-                <a:cs typeface="Courier New" panose="02070309020205020404" pitchFamily="49" charset="0"/>
-              </a:rPr>
-              <a:t>       </a:t>
-            </a:r>
-            <a:r>
-              <a:rPr lang="en-US" altLang="en-US" sz="5500" dirty="0">
-                <a:ea typeface="ＭＳ Ｐゴシック" panose="020B0600070205080204" pitchFamily="34" charset="-128"/>
-              </a:rPr>
-              <a:t>(highest precedence)</a:t>
-            </a:r>
-          </a:p>
-          <a:p>
-            <a:pPr marL="0" indent="0">
-              <a:buNone/>
-            </a:pPr>
-            <a:r>
-              <a:rPr lang="en-US" altLang="en-US" sz="5500" dirty="0">
-                <a:solidFill>
-                  <a:schemeClr val="accent2"/>
-                </a:solidFill>
-                <a:latin typeface="Lucida Sans Typewriter" panose="020B0509030504030204" pitchFamily="49" charset="0"/>
-                <a:ea typeface="ＭＳ Ｐゴシック" panose="020B0600070205080204" pitchFamily="34" charset="-128"/>
-              </a:rPr>
-              <a:t>*,/,//,%</a:t>
+                <a:ea typeface="ＭＳ Ｐゴシック" panose="020B0600070205080204" pitchFamily="34" charset="-128"/>
+              </a:rPr>
+              <a:t>: Write an expression to convert a given temperature in Fahrenheit to Celsius, and vice versa.</a:t>
             </a:r>
           </a:p>
           <a:p>
@@ -4461,6 +4449,90 @@
               </a:lnSpc>
               <a:buNone/>
             </a:pPr>
+            <a:endParaRPr lang="en-US" altLang="en-US" sz="5500" dirty="0">
+              <a:ea typeface="ＭＳ Ｐゴシック" panose="020B0600070205080204" pitchFamily="34" charset="-128"/>
+            </a:endParaRPr>
+          </a:p>
+          <a:p>
+            <a:pPr marL="0" indent="0">
+              <a:lnSpc>
+                <a:spcPct val="130000"/>
+              </a:lnSpc>
+              <a:buNone/>
+            </a:pPr>
+            <a:r>
+              <a:rPr lang="en-US" altLang="en-US" sz="5500" dirty="0">
+                <a:ea typeface="ＭＳ Ｐゴシック" panose="020B0600070205080204" pitchFamily="34" charset="-128"/>
+              </a:rPr>
+              <a:t>Operators have a </a:t>
+            </a:r>
+            <a:r>
+              <a:rPr lang="en-US" altLang="en-US" sz="5500" i="1" dirty="0">
+                <a:ea typeface="ＭＳ Ｐゴシック" panose="020B0600070205080204" pitchFamily="34" charset="-128"/>
+              </a:rPr>
+              <a:t>precedence</a:t>
+            </a:r>
+            <a:r>
+              <a:rPr lang="en-US" altLang="en-US" sz="5500" dirty="0">
+                <a:ea typeface="ＭＳ Ｐゴシック" panose="020B0600070205080204" pitchFamily="34" charset="-128"/>
+              </a:rPr>
+              <a:t> order:</a:t>
+            </a:r>
+          </a:p>
+          <a:p>
+            <a:pPr marL="0" indent="0">
+              <a:lnSpc>
+                <a:spcPct val="130000"/>
+              </a:lnSpc>
+              <a:buNone/>
+            </a:pPr>
+            <a:r>
+              <a:rPr lang="en-US" altLang="en-US" sz="5500" dirty="0">
+                <a:solidFill>
+                  <a:schemeClr val="accent2"/>
+                </a:solidFill>
+                <a:latin typeface="Lucida Sans Typewriter" panose="020B0509030504030204" pitchFamily="49" charset="0"/>
+                <a:ea typeface="ＭＳ Ｐゴシック" panose="020B0600070205080204" pitchFamily="34" charset="-128"/>
+              </a:rPr>
+              <a:t>** </a:t>
+            </a:r>
+            <a:r>
+              <a:rPr lang="en-US" altLang="en-US" sz="5500" dirty="0">
+                <a:latin typeface="Courier New" panose="02070309020205020404" pitchFamily="49" charset="0"/>
+                <a:ea typeface="ＭＳ Ｐゴシック" panose="020B0600070205080204" pitchFamily="34" charset="-128"/>
+                <a:cs typeface="Courier New" panose="02070309020205020404" pitchFamily="49" charset="0"/>
+              </a:rPr>
+              <a:t>       </a:t>
+            </a:r>
+            <a:r>
+              <a:rPr lang="en-US" altLang="en-US" sz="5500" dirty="0">
+                <a:ea typeface="ＭＳ Ｐゴシック" panose="020B0600070205080204" pitchFamily="34" charset="-128"/>
+              </a:rPr>
+              <a:t>(highest precedence)</a:t>
+            </a:r>
+          </a:p>
+          <a:p>
+            <a:pPr marL="0" indent="0">
+              <a:buNone/>
+            </a:pPr>
+            <a:r>
+              <a:rPr lang="en-US" altLang="en-US" sz="5500" dirty="0">
+                <a:solidFill>
+                  <a:schemeClr val="accent2"/>
+                </a:solidFill>
+                <a:latin typeface="Lucida Sans Typewriter" panose="020B0509030504030204" pitchFamily="49" charset="0"/>
+                <a:ea typeface="ＭＳ Ｐゴシック" panose="020B0600070205080204" pitchFamily="34" charset="-128"/>
+              </a:rPr>
+              <a:t>*,/,//,%</a:t>
+            </a:r>
+          </a:p>
+          <a:p>
+            <a:pPr marL="0" indent="0">
+              <a:lnSpc>
+                <a:spcPct val="130000"/>
+              </a:lnSpc>
+              <a:buNone/>
+            </a:pPr>
             <a:r>
               <a:rPr lang="en-US" altLang="en-US" sz="5500" dirty="0">
                 <a:solidFill>
@@ -4506,7 +4578,7 @@
               <a:rPr lang="en-US" altLang="en-US" sz="5500" dirty="0">
                 <a:ea typeface="ＭＳ Ｐゴシック" panose="020B0600070205080204" pitchFamily="34" charset="-128"/>
               </a:rPr>
-              <a:t>Operators of equal precedence are evaluated left to right, with the exception of exponentiation (**), evaluated right to left</a:t>
+              <a:t>Operators of equal precedence are evaluated left to right, or are they?</a:t>
             </a:r>
           </a:p>
           <a:p>
@@ -4585,20 +4657,6 @@
             <a:endParaRPr lang="en-US" altLang="en-US" sz="2400" dirty="0">
               <a:ea typeface="ＭＳ Ｐゴシック" panose="020B0600070205080204" pitchFamily="34" charset="-128"/>
             </a:endParaRPr>
-          </a:p>
-          <a:p>
-            <a:pPr marL="0" indent="0">
-              <a:lnSpc>
-                <a:spcPct val="130000"/>
-              </a:lnSpc>
-              <a:buNone/>
-            </a:pPr>
-            <a:r>
-              <a:rPr lang="en-US" altLang="en-US" sz="5500" dirty="0">
-                <a:ea typeface="ＭＳ Ｐゴシック" panose="020B0600070205080204" pitchFamily="34" charset="-128"/>
-              </a:rPr>
-              <a:t>Exercise: Write an expression to convert a given temperature in Fahrenheit to Celsius, and vice versa.</a:t>
-            </a:r>
           </a:p>
         </p:txBody>
       </p:sp>
@@ -4728,7 +4786,7 @@
               <a:rPr lang="en-US" altLang="en-US" sz="2300" dirty="0">
                 <a:ea typeface="ＭＳ Ｐゴシック" panose="020B0600070205080204" pitchFamily="34" charset="-128"/>
               </a:rPr>
-              <a:t>“Explicit is better than implicit.” – The Zen of Python, by Tim Peters</a:t>
+              <a:t>“Explicit is better than implicit.” – The Zen of Python</a:t>
             </a:r>
           </a:p>
         </p:txBody>
@@ -5326,7 +5384,7 @@
               <a:buNone/>
             </a:pPr>
             <a:r>
-              <a:rPr lang="en-US" altLang="en-US" sz="2300" dirty="0">
+              <a:rPr lang="en-US" altLang="en-US" sz="2300" b="1" dirty="0">
                 <a:ea typeface="ＭＳ Ｐゴシック" panose="020B0600070205080204" pitchFamily="34" charset="-128"/>
               </a:rPr>
               <a:t>Exercise 1.1</a:t>
@@ -5446,7 +5504,7 @@
         </p:spPr>
         <p:txBody>
           <a:bodyPr>
-            <a:normAutofit fontScale="85000" lnSpcReduction="20000"/>
+            <a:normAutofit lnSpcReduction="10000"/>
           </a:bodyPr>
           <a:lstStyle/>
           <a:p>
@@ -5610,21 +5668,6 @@
               <a:ea typeface="ＭＳ Ｐゴシック" panose="020B0600070205080204" pitchFamily="34" charset="-128"/>
               <a:cs typeface="Courier New" panose="02070309020205020404" pitchFamily="49" charset="0"/>
             </a:endParaRPr>
-          </a:p>
-          <a:p>
-            <a:pPr marL="0" indent="0">
-              <a:buNone/>
-            </a:pPr>
-            <a:r>
-              <a:rPr lang="en-US" altLang="en-US" sz="1400" dirty="0">
-                <a:solidFill>
-                  <a:schemeClr val="accent2"/>
-                </a:solidFill>
-                <a:latin typeface="Lucida Sans Typewriter" panose="020B0509030504030204" pitchFamily="49" charset="0"/>
-                <a:ea typeface="ＭＳ Ｐゴシック" panose="020B0600070205080204" pitchFamily="34" charset="-128"/>
-              </a:rPr>
-              <a:t>import this</a:t>
-            </a:r>
           </a:p>
         </p:txBody>
       </p:sp>
@@ -5729,7 +5772,31 @@
               <a:rPr lang="en-US" altLang="en-US" sz="9200" dirty="0">
                 <a:ea typeface="ＭＳ Ｐゴシック" panose="020B0600070205080204" pitchFamily="34" charset="-128"/>
               </a:rPr>
-              <a:t>Modules give us functions as well as useful constants.</a:t>
+              <a:t>Modules give us </a:t>
+            </a:r>
+            <a:r>
+              <a:rPr lang="en-US" altLang="en-US" sz="9200" i="1" dirty="0">
+                <a:ea typeface="ＭＳ Ｐゴシック" panose="020B0600070205080204" pitchFamily="34" charset="-128"/>
+              </a:rPr>
+              <a:t>functions</a:t>
+            </a:r>
+            <a:r>
+              <a:rPr lang="en-US" altLang="en-US" sz="9200" dirty="0">
+                <a:ea typeface="ＭＳ Ｐゴシック" panose="020B0600070205080204" pitchFamily="34" charset="-128"/>
+              </a:rPr>
+              <a:t> as well as useful </a:t>
+            </a:r>
+            <a:r>
+              <a:rPr lang="en-US" altLang="en-US" sz="9200" i="1" dirty="0">
+                <a:ea typeface="ＭＳ Ｐゴシック" panose="020B0600070205080204" pitchFamily="34" charset="-128"/>
+              </a:rPr>
+              <a:t>constants</a:t>
+            </a:r>
+            <a:r>
+              <a:rPr lang="en-US" altLang="en-US" sz="9200" dirty="0">
+                <a:ea typeface="ＭＳ Ｐゴシック" panose="020B0600070205080204" pitchFamily="34" charset="-128"/>
+              </a:rPr>
+              <a:t>.</a:t>
             </a:r>
           </a:p>
           <a:p>
@@ -5740,10 +5807,16 @@
               <a:buNone/>
             </a:pPr>
             <a:r>
+              <a:rPr lang="en-US" altLang="en-US" sz="9200" b="1" dirty="0">
+                <a:ea typeface="ＭＳ Ｐゴシック" panose="020B0600070205080204" pitchFamily="34" charset="-128"/>
+              </a:rPr>
+              <a:t>Exercise 1.2</a:t>
+            </a:r>
+            <a:r>
               <a:rPr lang="en-US" altLang="en-US" sz="9200" dirty="0">
                 <a:ea typeface="ＭＳ Ｐゴシック" panose="020B0600070205080204" pitchFamily="34" charset="-128"/>
               </a:rPr>
-              <a:t>Exercise 1.2: Find the area of a circle given its radius.</a:t>
+              <a:t>: Find the area of a circle given its radius.</a:t>
             </a:r>
           </a:p>
           <a:p>
@@ -5823,7 +5896,19 @@
               <a:rPr lang="en-US" altLang="en-US" sz="9200" dirty="0">
                 <a:ea typeface="ＭＳ Ｐゴシック" panose="020B0600070205080204" pitchFamily="34" charset="-128"/>
               </a:rPr>
-              <a:t>We can import everything inside the module</a:t>
+              <a:t>We can import </a:t>
+            </a:r>
+            <a:r>
+              <a:rPr lang="en-US" altLang="en-US" sz="9200" i="1" dirty="0">
+                <a:ea typeface="ＭＳ Ｐゴシック" panose="020B0600070205080204" pitchFamily="34" charset="-128"/>
+              </a:rPr>
+              <a:t>everything</a:t>
+            </a:r>
+            <a:r>
+              <a:rPr lang="en-US" altLang="en-US" sz="9200" dirty="0">
+                <a:ea typeface="ＭＳ Ｐゴシック" panose="020B0600070205080204" pitchFamily="34" charset="-128"/>
+              </a:rPr>
+              <a:t> inside the module</a:t>
             </a:r>
           </a:p>
           <a:p>
@@ -5849,10 +5934,16 @@
               <a:buNone/>
             </a:pPr>
             <a:r>
+              <a:rPr lang="en-US" altLang="en-US" sz="9200" b="1" dirty="0">
+                <a:ea typeface="ＭＳ Ｐゴシック" panose="020B0600070205080204" pitchFamily="34" charset="-128"/>
+              </a:rPr>
+              <a:t>Exercise 1.3: </a:t>
+            </a:r>
+            <a:r>
               <a:rPr lang="en-US" altLang="en-US" sz="9200" dirty="0">
                 <a:ea typeface="ＭＳ Ｐゴシック" panose="020B0600070205080204" pitchFamily="34" charset="-128"/>
               </a:rPr>
-              <a:t>Exercise 1.3: Importing everything from a module</a:t>
+              <a:t>Importing everything from a module</a:t>
             </a:r>
           </a:p>
         </p:txBody>
@@ -6316,7 +6407,43 @@
               <a:rPr lang="en-US" altLang="en-US" sz="2300" dirty="0">
                 <a:ea typeface="ＭＳ Ｐゴシック" panose="020B0600070205080204" pitchFamily="34" charset="-128"/>
               </a:rPr>
-              <a:t>Logic Operators not, and, or can be used with </a:t>
+              <a:t>Logic Operators </a:t>
+            </a:r>
+            <a:r>
+              <a:rPr lang="en-US" altLang="en-US" sz="2300" i="1" dirty="0">
+                <a:ea typeface="ＭＳ Ｐゴシック" panose="020B0600070205080204" pitchFamily="34" charset="-128"/>
+              </a:rPr>
+              <a:t>not</a:t>
+            </a:r>
+            <a:r>
+              <a:rPr lang="en-US" altLang="en-US" sz="2300" dirty="0">
+                <a:ea typeface="ＭＳ Ｐゴシック" panose="020B0600070205080204" pitchFamily="34" charset="-128"/>
+              </a:rPr>
+              <a:t>, </a:t>
+            </a:r>
+            <a:r>
+              <a:rPr lang="en-US" altLang="en-US" sz="2300" i="1" dirty="0">
+                <a:ea typeface="ＭＳ Ｐゴシック" panose="020B0600070205080204" pitchFamily="34" charset="-128"/>
+              </a:rPr>
+              <a:t>and</a:t>
+            </a:r>
+            <a:r>
+              <a:rPr lang="en-US" altLang="en-US" sz="2300" dirty="0">
+                <a:ea typeface="ＭＳ Ｐゴシック" panose="020B0600070205080204" pitchFamily="34" charset="-128"/>
+              </a:rPr>
+              <a:t>, </a:t>
+            </a:r>
+            <a:r>
+              <a:rPr lang="en-US" altLang="en-US" sz="2300" i="1" dirty="0">
+                <a:ea typeface="ＭＳ Ｐゴシック" panose="020B0600070205080204" pitchFamily="34" charset="-128"/>
+              </a:rPr>
+              <a:t>or </a:t>
+            </a:r>
+            <a:r>
+              <a:rPr lang="en-US" altLang="en-US" sz="2300" dirty="0">
+                <a:ea typeface="ＭＳ Ｐゴシック" panose="020B0600070205080204" pitchFamily="34" charset="-128"/>
+              </a:rPr>
+              <a:t>can be used with </a:t>
             </a:r>
             <a:r>
               <a:rPr lang="en-US" altLang="en-US" sz="2300" dirty="0" err="1">
@@ -6888,7 +7015,19 @@
               <a:rPr lang="en-US" altLang="en-US" sz="2700" dirty="0">
                 <a:ea typeface="ＭＳ Ｐゴシック" panose="020B0600070205080204" pitchFamily="34" charset="-128"/>
               </a:rPr>
-              <a:t>Used to represent absence of a value.</a:t>
+              <a:t>Used to represent </a:t>
+            </a:r>
+            <a:r>
+              <a:rPr lang="en-US" altLang="en-US" sz="2700" i="1" dirty="0">
+                <a:ea typeface="ＭＳ Ｐゴシック" panose="020B0600070205080204" pitchFamily="34" charset="-128"/>
+              </a:rPr>
+              <a:t>absence</a:t>
+            </a:r>
+            <a:r>
+              <a:rPr lang="en-US" altLang="en-US" sz="2700" dirty="0">
+                <a:ea typeface="ＭＳ Ｐゴシック" panose="020B0600070205080204" pitchFamily="34" charset="-128"/>
+              </a:rPr>
+              <a:t> of a value.</a:t>
             </a:r>
           </a:p>
           <a:p>
@@ -8371,7 +8510,7 @@
               <a:buNone/>
             </a:pPr>
             <a:r>
-              <a:rPr lang="en-US" altLang="en-US" sz="2500" dirty="0">
+              <a:rPr lang="en-US" altLang="en-US" sz="2500" b="1" dirty="0">
                 <a:ea typeface="ＭＳ Ｐゴシック" panose="020B0600070205080204" pitchFamily="34" charset="-128"/>
               </a:rPr>
               <a:t>Exercise 1.4</a:t>
@@ -9302,7 +9441,7 @@
                 <a:latin typeface="Lucida Sans Typewriter" panose="020B0509030504030204" pitchFamily="49" charset="0"/>
                 <a:ea typeface="ＭＳ Ｐゴシック" panose="020B0600070205080204" pitchFamily="34" charset="-128"/>
               </a:rPr>
-              <a:t>z = 5 / 2  # Answer 2, or 2.5 ?</a:t>
+              <a:t>z = 5 * 2</a:t>
             </a:r>
           </a:p>
           <a:p>
@@ -9327,155 +9466,6 @@
                 <a:ea typeface="ＭＳ Ｐゴシック" panose="020B0600070205080204" pitchFamily="34" charset="-128"/>
               </a:rPr>
               <a:t>x = 3.456</a:t>
-            </a:r>
-          </a:p>
-          <a:p>
-            <a:r>
-              <a:rPr lang="en-US" altLang="en-US" dirty="0">
-                <a:ea typeface="ＭＳ Ｐゴシック" panose="020B0600070205080204" pitchFamily="34" charset="-128"/>
-              </a:rPr>
-              <a:t>Strings</a:t>
-            </a:r>
-          </a:p>
-          <a:p>
-            <a:pPr lvl="1"/>
-            <a:r>
-              <a:rPr lang="en-US" altLang="en-US" sz="2600" dirty="0">
-                <a:ea typeface="ＭＳ Ｐゴシック" panose="020B0600070205080204" pitchFamily="34" charset="-128"/>
-              </a:rPr>
-              <a:t>Can use “” or ‘’ to specify with </a:t>
-            </a:r>
-            <a:r>
-              <a:rPr lang="en-US" altLang="en-US" sz="2600" dirty="0">
-                <a:solidFill>
-                  <a:schemeClr val="accent2"/>
-                </a:solidFill>
-                <a:latin typeface="Lucida Sans Typewriter" panose="020B0509030504030204" pitchFamily="49" charset="0"/>
-                <a:ea typeface="ＭＳ Ｐゴシック" panose="020B0600070205080204" pitchFamily="34" charset="-128"/>
-              </a:rPr>
-              <a:t>“</a:t>
-            </a:r>
-            <a:r>
-              <a:rPr lang="en-US" altLang="en-US" sz="2600" dirty="0" err="1">
-                <a:solidFill>
-                  <a:schemeClr val="accent2"/>
-                </a:solidFill>
-                <a:latin typeface="Lucida Sans Typewriter" panose="020B0509030504030204" pitchFamily="49" charset="0"/>
-                <a:ea typeface="ＭＳ Ｐゴシック" panose="020B0600070205080204" pitchFamily="34" charset="-128"/>
-              </a:rPr>
-              <a:t>abc</a:t>
-            </a:r>
-            <a:r>
-              <a:rPr lang="en-US" altLang="en-US" sz="2600" dirty="0">
-                <a:solidFill>
-                  <a:schemeClr val="accent2"/>
-                </a:solidFill>
-                <a:latin typeface="Lucida Sans Typewriter" panose="020B0509030504030204" pitchFamily="49" charset="0"/>
-                <a:ea typeface="ＭＳ Ｐゴシック" panose="020B0600070205080204" pitchFamily="34" charset="-128"/>
-              </a:rPr>
-              <a:t>” </a:t>
-            </a:r>
-            <a:r>
-              <a:rPr lang="en-US" altLang="en-US" sz="2600" dirty="0">
-                <a:ea typeface="ＭＳ Ｐゴシック" panose="020B0600070205080204" pitchFamily="34" charset="-128"/>
-              </a:rPr>
-              <a:t>== </a:t>
-            </a:r>
-            <a:r>
-              <a:rPr lang="en-US" altLang="en-US" sz="2600" dirty="0">
-                <a:solidFill>
-                  <a:schemeClr val="accent2"/>
-                </a:solidFill>
-                <a:latin typeface="Lucida Sans Typewriter" panose="020B0509030504030204" pitchFamily="49" charset="0"/>
-                <a:ea typeface="ＭＳ Ｐゴシック" panose="020B0600070205080204" pitchFamily="34" charset="-128"/>
-              </a:rPr>
-              <a:t>‘</a:t>
-            </a:r>
-            <a:r>
-              <a:rPr lang="en-US" altLang="en-US" sz="2600" dirty="0" err="1">
-                <a:solidFill>
-                  <a:schemeClr val="accent2"/>
-                </a:solidFill>
-                <a:latin typeface="Lucida Sans Typewriter" panose="020B0509030504030204" pitchFamily="49" charset="0"/>
-                <a:ea typeface="ＭＳ Ｐゴシック" panose="020B0600070205080204" pitchFamily="34" charset="-128"/>
-              </a:rPr>
-              <a:t>abc</a:t>
-            </a:r>
-            <a:r>
-              <a:rPr lang="en-US" altLang="en-US" sz="2600" dirty="0">
-                <a:solidFill>
-                  <a:schemeClr val="accent2"/>
-                </a:solidFill>
-                <a:latin typeface="Lucida Sans Typewriter" panose="020B0509030504030204" pitchFamily="49" charset="0"/>
-                <a:ea typeface="ＭＳ Ｐゴシック" panose="020B0600070205080204" pitchFamily="34" charset="-128"/>
-              </a:rPr>
-              <a:t>’</a:t>
-            </a:r>
-            <a:endParaRPr lang="en-US" altLang="en-US" sz="2600" dirty="0">
-              <a:ea typeface="ＭＳ Ｐゴシック" panose="020B0600070205080204" pitchFamily="34" charset="-128"/>
-            </a:endParaRPr>
-          </a:p>
-          <a:p>
-            <a:pPr lvl="1"/>
-            <a:r>
-              <a:rPr lang="en-US" altLang="en-US" sz="2600" dirty="0">
-                <a:ea typeface="ＭＳ Ｐゴシック" panose="020B0600070205080204" pitchFamily="34" charset="-128"/>
-              </a:rPr>
-              <a:t>Unmatched can occur within the string: </a:t>
-            </a:r>
-            <a:r>
-              <a:rPr lang="en-US" altLang="en-US" sz="2600" dirty="0">
-                <a:solidFill>
-                  <a:schemeClr val="accent2"/>
-                </a:solidFill>
-                <a:latin typeface="Lucida Sans Typewriter" panose="020B0509030504030204" pitchFamily="49" charset="0"/>
-                <a:ea typeface="ＭＳ Ｐゴシック" panose="020B0600070205080204" pitchFamily="34" charset="-128"/>
-              </a:rPr>
-              <a:t>“matt’s”</a:t>
-            </a:r>
-          </a:p>
-          <a:p>
-            <a:pPr lvl="1"/>
-            <a:r>
-              <a:rPr lang="en-US" altLang="en-US" sz="2600" dirty="0">
-                <a:ea typeface="ＭＳ Ｐゴシック" panose="020B0600070205080204" pitchFamily="34" charset="-128"/>
-              </a:rPr>
-              <a:t>Use triple double-quotes for multi-line strings or strings than contain both ‘ and “ inside of them:  </a:t>
-            </a:r>
-            <a:br>
-              <a:rPr lang="en-US" altLang="en-US" sz="2600" dirty="0">
-                <a:ea typeface="ＭＳ Ｐゴシック" panose="020B0600070205080204" pitchFamily="34" charset="-128"/>
-              </a:rPr>
-            </a:br>
-            <a:r>
-              <a:rPr lang="en-US" altLang="en-US" sz="2600" dirty="0">
-                <a:solidFill>
-                  <a:schemeClr val="accent2"/>
-                </a:solidFill>
-                <a:latin typeface="Lucida Sans Typewriter" panose="020B0509030504030204" pitchFamily="49" charset="0"/>
-                <a:ea typeface="ＭＳ Ｐゴシック" panose="020B0600070205080204" pitchFamily="34" charset="-128"/>
-              </a:rPr>
-              <a:t>“““</a:t>
-            </a:r>
-            <a:r>
-              <a:rPr lang="en-US" altLang="en-US" sz="2600" dirty="0" err="1">
-                <a:solidFill>
-                  <a:schemeClr val="accent2"/>
-                </a:solidFill>
-                <a:latin typeface="Lucida Sans Typewriter" panose="020B0509030504030204" pitchFamily="49" charset="0"/>
-                <a:ea typeface="ＭＳ Ｐゴシック" panose="020B0600070205080204" pitchFamily="34" charset="-128"/>
-              </a:rPr>
-              <a:t>a‘b“c</a:t>
-            </a:r>
-            <a:r>
-              <a:rPr lang="en-US" altLang="en-US" sz="2600" dirty="0">
-                <a:solidFill>
-                  <a:schemeClr val="accent2"/>
-                </a:solidFill>
-                <a:latin typeface="Lucida Sans Typewriter" panose="020B0509030504030204" pitchFamily="49" charset="0"/>
-                <a:ea typeface="ＭＳ Ｐゴシック" panose="020B0600070205080204" pitchFamily="34" charset="-128"/>
-              </a:rPr>
-              <a:t>”””</a:t>
             </a:r>
           </a:p>
         </p:txBody>
@@ -9562,7 +9552,7 @@
         <p:spPr/>
         <p:txBody>
           <a:bodyPr>
-            <a:normAutofit fontScale="85000" lnSpcReduction="20000"/>
+            <a:normAutofit/>
           </a:bodyPr>
           <a:lstStyle/>
           <a:p>
@@ -9572,72 +9562,95 @@
               </a:spcAft>
             </a:pPr>
             <a:r>
+              <a:rPr lang="en-US" altLang="en-US" dirty="0">
+                <a:ea typeface="ＭＳ Ｐゴシック" panose="020B0600070205080204" pitchFamily="34" charset="-128"/>
+              </a:rPr>
+              <a:t>You create a </a:t>
+            </a:r>
+            <a:r>
               <a:rPr lang="en-US" altLang="en-US" i="1" dirty="0">
                 <a:ea typeface="ＭＳ Ｐゴシック" panose="020B0600070205080204" pitchFamily="34" charset="-128"/>
               </a:rPr>
-              <a:t>Binding a variable</a:t>
+              <a:t>name</a:t>
             </a:r>
             <a:r>
               <a:rPr lang="en-US" altLang="en-US" dirty="0">
                 <a:ea typeface="ＭＳ Ｐゴシック" panose="020B0600070205080204" pitchFamily="34" charset="-128"/>
               </a:rPr>
-              <a:t> in Python means setting a </a:t>
-            </a:r>
-            <a:r>
-              <a:rPr lang="en-US" altLang="en-US" i="1" dirty="0">
-                <a:solidFill>
-                  <a:schemeClr val="accent2"/>
-                </a:solidFill>
-                <a:ea typeface="ＭＳ Ｐゴシック" panose="020B0600070205080204" pitchFamily="34" charset="-128"/>
-              </a:rPr>
+              <a:t> the first time it appears on the left side of an assignment expression:    </a:t>
+            </a:r>
+            <a:br>
+              <a:rPr lang="en-US" altLang="en-US" dirty="0">
+                <a:ea typeface="ＭＳ Ｐゴシック" panose="020B0600070205080204" pitchFamily="34" charset="-128"/>
+              </a:rPr>
+            </a:br>
+            <a:r>
+              <a:rPr lang="en-US" altLang="en-US" sz="2000" dirty="0">
+                <a:solidFill>
+                  <a:schemeClr val="accent2"/>
+                </a:solidFill>
+                <a:latin typeface="Lucida Sans Typewriter" panose="020B0509030504030204" pitchFamily="49" charset="0"/>
+                <a:ea typeface="ＭＳ Ｐゴシック" panose="020B0600070205080204" pitchFamily="34" charset="-128"/>
+              </a:rPr>
+              <a:t>	x = 3</a:t>
+            </a:r>
+          </a:p>
+          <a:p>
+            <a:pPr lvl="0"/>
+            <a:r>
+              <a:rPr lang="en-US" dirty="0"/>
+              <a:t>We set a </a:t>
+            </a:r>
+            <a:r>
+              <a:rPr lang="en-US" i="1" dirty="0"/>
               <a:t>name</a:t>
             </a:r>
             <a:r>
-              <a:rPr lang="en-US" altLang="en-US" dirty="0">
-                <a:ea typeface="ＭＳ Ｐゴシック" panose="020B0600070205080204" pitchFamily="34" charset="-128"/>
-              </a:rPr>
+              <a:rPr lang="en-US" dirty="0"/>
               <a:t> to hold a </a:t>
             </a:r>
             <a:r>
-              <a:rPr lang="en-US" altLang="en-US" i="1" dirty="0">
-                <a:solidFill>
-                  <a:schemeClr val="accent2"/>
-                </a:solidFill>
-                <a:ea typeface="ＭＳ Ｐゴシック" panose="020B0600070205080204" pitchFamily="34" charset="-128"/>
-              </a:rPr>
+              <a:rPr lang="en-US" i="1" dirty="0"/>
               <a:t>reference</a:t>
             </a:r>
             <a:r>
-              <a:rPr lang="en-US" altLang="en-US" dirty="0">
-                <a:ea typeface="ＭＳ Ｐゴシック" panose="020B0600070205080204" pitchFamily="34" charset="-128"/>
-              </a:rPr>
+              <a:rPr lang="en-US" dirty="0"/>
               <a:t> to some </a:t>
             </a:r>
             <a:r>
-              <a:rPr lang="en-US" altLang="en-US" i="1" dirty="0">
-                <a:solidFill>
-                  <a:schemeClr val="accent2"/>
-                </a:solidFill>
-                <a:ea typeface="ＭＳ Ｐゴシック" panose="020B0600070205080204" pitchFamily="34" charset="-128"/>
-              </a:rPr>
+              <a:rPr lang="en-US" i="1" dirty="0"/>
               <a:t>object</a:t>
             </a:r>
-            <a:endParaRPr lang="en-US" altLang="en-US" dirty="0">
+            <a:endParaRPr lang="en-US" dirty="0"/>
+          </a:p>
+          <a:p>
+            <a:pPr lvl="1"/>
+            <a:r>
+              <a:rPr lang="en-US" i="1" dirty="0"/>
+              <a:t>Assignment creates references, not copies</a:t>
+            </a:r>
+            <a:endParaRPr lang="en-US" dirty="0"/>
+          </a:p>
+          <a:p>
+            <a:pPr lvl="0"/>
+            <a:r>
+              <a:rPr lang="en-US" dirty="0"/>
+              <a:t>Names in Python do not have an intrinsic type,  objects have types</a:t>
+            </a:r>
+          </a:p>
+          <a:p>
+            <a:pPr lvl="1"/>
+            <a:r>
+              <a:rPr lang="en-US" dirty="0"/>
+              <a:t>Python determines the type of the reference automatically based on what data is assigned to it</a:t>
+            </a:r>
+            <a:endParaRPr lang="en-US" altLang="en-US" sz="2000" dirty="0">
+              <a:solidFill>
+                <a:schemeClr val="accent2"/>
+              </a:solidFill>
+              <a:latin typeface="Lucida Sans Typewriter" panose="020B0509030504030204" pitchFamily="49" charset="0"/>
               <a:ea typeface="ＭＳ Ｐゴシック" panose="020B0600070205080204" pitchFamily="34" charset="-128"/>
             </a:endParaRPr>
-          </a:p>
-          <a:p>
-            <a:pPr lvl="1">
-              <a:spcAft>
-                <a:spcPct val="15000"/>
-              </a:spcAft>
-            </a:pPr>
-            <a:r>
-              <a:rPr lang="en-US" altLang="en-US" i="1" dirty="0">
-                <a:ea typeface="ＭＳ Ｐゴシック" panose="020B0600070205080204" pitchFamily="34" charset="-128"/>
-              </a:rPr>
-              <a:t>Assignment creates references, not copies</a:t>
-            </a:r>
           </a:p>
           <a:p>
             <a:pPr>
@@ -9649,88 +9662,19 @@
               <a:rPr lang="en-US" altLang="en-US" dirty="0">
                 <a:ea typeface="ＭＳ Ｐゴシック" panose="020B0600070205080204" pitchFamily="34" charset="-128"/>
               </a:rPr>
-              <a:t>Names in Python do not have an intrinsic type,  objects have types</a:t>
-            </a:r>
-          </a:p>
-          <a:p>
-            <a:pPr lvl="1">
-              <a:spcAft>
-                <a:spcPct val="15000"/>
-              </a:spcAft>
-            </a:pPr>
+              <a:t>A reference is deleted via </a:t>
+            </a:r>
+            <a:r>
+              <a:rPr lang="en-US" altLang="en-US" i="1" dirty="0">
+                <a:ea typeface="ＭＳ Ｐゴシック" panose="020B0600070205080204" pitchFamily="34" charset="-128"/>
+              </a:rPr>
+              <a:t>garbage collection </a:t>
+            </a:r>
             <a:r>
               <a:rPr lang="en-US" altLang="en-US" dirty="0">
                 <a:ea typeface="ＭＳ Ｐゴシック" panose="020B0600070205080204" pitchFamily="34" charset="-128"/>
               </a:rPr>
-              <a:t>Python determines the type of the reference automatically based on what data is assigned to it</a:t>
-            </a:r>
-          </a:p>
-          <a:p>
-            <a:pPr>
-              <a:spcAft>
-                <a:spcPct val="15000"/>
-              </a:spcAft>
-            </a:pPr>
-            <a:r>
-              <a:rPr lang="en-US" altLang="en-US" dirty="0">
-                <a:ea typeface="ＭＳ Ｐゴシック" panose="020B0600070205080204" pitchFamily="34" charset="-128"/>
-              </a:rPr>
-              <a:t>You create a name the first time it appears on the left side of an assignment expression:    </a:t>
-            </a:r>
-            <a:br>
-              <a:rPr lang="en-US" altLang="en-US" dirty="0">
-                <a:ea typeface="ＭＳ Ｐゴシック" panose="020B0600070205080204" pitchFamily="34" charset="-128"/>
-              </a:rPr>
-            </a:br>
-            <a:r>
-              <a:rPr lang="en-US" altLang="en-US" sz="2000" dirty="0">
-                <a:solidFill>
-                  <a:schemeClr val="accent2"/>
-                </a:solidFill>
-                <a:latin typeface="Lucida Sans Typewriter" panose="020B0509030504030204" pitchFamily="49" charset="0"/>
-                <a:ea typeface="ＭＳ Ｐゴシック" panose="020B0600070205080204" pitchFamily="34" charset="-128"/>
-              </a:rPr>
-              <a:t>	x = 3</a:t>
-            </a:r>
-          </a:p>
-          <a:p>
-            <a:pPr>
-              <a:spcAft>
-                <a:spcPct val="15000"/>
-              </a:spcAft>
-            </a:pPr>
-            <a:r>
-              <a:rPr lang="en-US" altLang="en-US" dirty="0">
-                <a:ea typeface="ＭＳ Ｐゴシック" panose="020B0600070205080204" pitchFamily="34" charset="-128"/>
-              </a:rPr>
-              <a:t>A reference is deleted via garbage collection after any names bound to it have passed out of scope</a:t>
-            </a:r>
-          </a:p>
-          <a:p>
-            <a:pPr marL="236538" indent="-236538"/>
-            <a:r>
-              <a:rPr lang="en-US" altLang="en-US" sz="3200" dirty="0">
-                <a:ea typeface="ＭＳ Ｐゴシック" panose="020B0600070205080204" pitchFamily="34" charset="-128"/>
-              </a:rPr>
-              <a:t>Assignments can be chained</a:t>
-            </a:r>
-          </a:p>
-          <a:p>
-            <a:pPr marL="0" indent="0">
-              <a:spcAft>
-                <a:spcPct val="15000"/>
-              </a:spcAft>
-              <a:buNone/>
-            </a:pPr>
-            <a:r>
-              <a:rPr lang="en-US" altLang="en-US" sz="2000" dirty="0">
-                <a:solidFill>
-                  <a:schemeClr val="accent2"/>
-                </a:solidFill>
-                <a:latin typeface="Lucida Sans Typewriter" panose="020B0509030504030204" pitchFamily="49" charset="0"/>
-                <a:ea typeface="ＭＳ Ｐゴシック" panose="020B0600070205080204" pitchFamily="34" charset="-128"/>
-              </a:rPr>
-              <a:t>	a = b = x = 3  # Are these referring to the same location?</a:t>
+              <a:t>after any names bound to it have passed out of scope</a:t>
             </a:r>
           </a:p>
         </p:txBody>
@@ -10132,7 +10076,7 @@
         </p:spPr>
         <p:txBody>
           <a:bodyPr>
-            <a:normAutofit fontScale="32500" lnSpcReduction="20000"/>
+            <a:normAutofit fontScale="40000" lnSpcReduction="20000"/>
           </a:bodyPr>
           <a:lstStyle/>
           <a:p>
@@ -10231,60 +10175,6 @@
                 <a:ea typeface="ＭＳ Ｐゴシック" panose="020B0600070205080204" pitchFamily="34" charset="-128"/>
               </a:rPr>
               <a:t>11</a:t>
-            </a:r>
-          </a:p>
-          <a:p>
-            <a:pPr marL="0" indent="0">
-              <a:spcAft>
-                <a:spcPct val="15000"/>
-              </a:spcAft>
-              <a:buNone/>
-            </a:pPr>
-            <a:r>
-              <a:rPr lang="en-US" altLang="en-US" sz="3400" dirty="0">
-                <a:solidFill>
-                  <a:schemeClr val="accent2"/>
-                </a:solidFill>
-                <a:latin typeface="Lucida Sans Typewriter" panose="020B0509030504030204" pitchFamily="49" charset="0"/>
-                <a:ea typeface="ＭＳ Ｐゴシック" panose="020B0600070205080204" pitchFamily="34" charset="-128"/>
-              </a:rPr>
-              <a:t>&gt;&gt;&gt; y += 1</a:t>
-            </a:r>
-          </a:p>
-          <a:p>
-            <a:pPr marL="0" indent="0">
-              <a:spcAft>
-                <a:spcPct val="15000"/>
-              </a:spcAft>
-              <a:buNone/>
-            </a:pPr>
-            <a:r>
-              <a:rPr lang="en-US" altLang="en-US" sz="3400" dirty="0">
-                <a:solidFill>
-                  <a:schemeClr val="accent2"/>
-                </a:solidFill>
-                <a:latin typeface="Lucida Sans Typewriter" panose="020B0509030504030204" pitchFamily="49" charset="0"/>
-                <a:ea typeface="ＭＳ Ｐゴシック" panose="020B0600070205080204" pitchFamily="34" charset="-128"/>
-              </a:rPr>
-              <a:t>&gt;&gt;&gt; y</a:t>
-            </a:r>
-          </a:p>
-          <a:p>
-            <a:pPr marL="0" indent="0">
-              <a:spcAft>
-                <a:spcPct val="15000"/>
-              </a:spcAft>
-              <a:buNone/>
-            </a:pPr>
-            <a:r>
-              <a:rPr lang="en-US" altLang="en-US" sz="3400" dirty="0">
-                <a:solidFill>
-                  <a:schemeClr val="accent2"/>
-                </a:solidFill>
-                <a:latin typeface="Lucida Sans Typewriter" panose="020B0509030504030204" pitchFamily="49" charset="0"/>
-                <a:ea typeface="ＭＳ Ｐゴシック" panose="020B0600070205080204" pitchFamily="34" charset="-128"/>
-              </a:rPr>
-              <a:t>12</a:t>
             </a:r>
           </a:p>
           <a:p>
@@ -10450,12 +10340,12 @@
         <p:spPr>
           <a:xfrm>
             <a:off x="838200" y="1825625"/>
-            <a:ext cx="4774035" cy="4432562"/>
+            <a:ext cx="10515600" cy="4432562"/>
           </a:xfrm>
         </p:spPr>
         <p:txBody>
           <a:bodyPr>
-            <a:normAutofit fontScale="62500" lnSpcReduction="20000"/>
+            <a:normAutofit fontScale="70000" lnSpcReduction="20000"/>
           </a:bodyPr>
           <a:lstStyle/>
           <a:p>
@@ -10662,370 +10552,6 @@
                 <a:ea typeface="ＭＳ Ｐゴシック" panose="020B0600070205080204" pitchFamily="34" charset="-128"/>
               </a:rPr>
               <a:t>False</a:t>
-            </a:r>
-          </a:p>
-        </p:txBody>
-      </p:sp>
-      <p:sp>
-        <p:nvSpPr>
-          <p:cNvPr id="4" name="Content Placeholder 2">
-            <a:extLst>
-              <a:ext uri="{FF2B5EF4-FFF2-40B4-BE49-F238E27FC236}">
-                <a16:creationId xmlns:a16="http://schemas.microsoft.com/office/drawing/2014/main" id="{2FFE23C2-2578-4722-8B4D-D7ACDCAA5520}"/>
-              </a:ext>
-            </a:extLst>
-          </p:cNvPr>
-          <p:cNvSpPr txBox="1">
-            <a:spLocks/>
-          </p:cNvSpPr>
-          <p:nvPr/>
-        </p:nvSpPr>
-        <p:spPr>
-          <a:xfrm>
-            <a:off x="6096000" y="1810245"/>
-            <a:ext cx="5822659" cy="4432562"/>
-          </a:xfrm>
-          <a:prstGeom prst="rect">
-            <a:avLst/>
-          </a:prstGeom>
-        </p:spPr>
-        <p:txBody>
-          <a:bodyPr vert="horz" lIns="91440" tIns="45720" rIns="91440" bIns="45720" rtlCol="0">
-            <a:normAutofit/>
-          </a:bodyPr>
-          <a:lstStyle>
-            <a:lvl1pPr marL="228600" indent="-228600" algn="l" defTabSz="914400" rtl="0" eaLnBrk="1" latinLnBrk="0" hangingPunct="1">
-              <a:lnSpc>
-                <a:spcPct val="90000"/>
-              </a:lnSpc>
-              <a:spcBef>
-                <a:spcPts val="1000"/>
-              </a:spcBef>
-              <a:buFont typeface="Arial" panose="020B0604020202020204" pitchFamily="34" charset="0"/>
-              <a:buChar char="•"/>
-              <a:defRPr sz="2800" kern="1200">
-                <a:solidFill>
-                  <a:schemeClr val="tx1"/>
-                </a:solidFill>
-                <a:latin typeface="+mn-lt"/>
-                <a:ea typeface="+mn-ea"/>
-                <a:cs typeface="+mn-cs"/>
-              </a:defRPr>
-            </a:lvl1pPr>
-            <a:lvl2pPr marL="685800" indent="-228600" algn="l" defTabSz="914400" rtl="0" eaLnBrk="1" latinLnBrk="0" hangingPunct="1">
-              <a:lnSpc>
-                <a:spcPct val="90000"/>
-              </a:lnSpc>
-              <a:spcBef>
-                <a:spcPts val="500"/>
-              </a:spcBef>
-              <a:buFont typeface="Arial" panose="020B0604020202020204" pitchFamily="34" charset="0"/>
-              <a:buChar char="•"/>
-              <a:defRPr sz="2400" kern="1200">
-                <a:solidFill>
-                  <a:schemeClr val="tx1"/>
-                </a:solidFill>
-                <a:latin typeface="+mn-lt"/>
-                <a:ea typeface="+mn-ea"/>
-                <a:cs typeface="+mn-cs"/>
-              </a:defRPr>
-            </a:lvl2pPr>
-            <a:lvl3pPr marL="1143000" indent="-228600" algn="l" defTabSz="914400" rtl="0" eaLnBrk="1" latinLnBrk="0" hangingPunct="1">
-              <a:lnSpc>
-                <a:spcPct val="90000"/>
-              </a:lnSpc>
-              <a:spcBef>
-                <a:spcPts val="500"/>
-              </a:spcBef>
-              <a:buFont typeface="Arial" panose="020B0604020202020204" pitchFamily="34" charset="0"/>
-              <a:buChar char="•"/>
-              <a:defRPr sz="2000" kern="1200">
-                <a:solidFill>
-                  <a:schemeClr val="tx1"/>
-                </a:solidFill>
-                <a:latin typeface="+mn-lt"/>
-                <a:ea typeface="+mn-ea"/>
-                <a:cs typeface="+mn-cs"/>
-              </a:defRPr>
-            </a:lvl3pPr>
-            <a:lvl4pPr marL="1600200" indent="-228600" algn="l" defTabSz="914400" rtl="0" eaLnBrk="1" latinLnBrk="0" hangingPunct="1">
-              <a:lnSpc>
-                <a:spcPct val="90000"/>
-              </a:lnSpc>
-              <a:spcBef>
-                <a:spcPts val="500"/>
-              </a:spcBef>
-              <a:buFont typeface="Arial" panose="020B0604020202020204" pitchFamily="34" charset="0"/>
-              <a:buChar char="•"/>
-              <a:defRPr sz="1800" kern="1200">
-                <a:solidFill>
-                  <a:schemeClr val="tx1"/>
-                </a:solidFill>
-                <a:latin typeface="+mn-lt"/>
-                <a:ea typeface="+mn-ea"/>
-                <a:cs typeface="+mn-cs"/>
-              </a:defRPr>
-            </a:lvl4pPr>
-            <a:lvl5pPr marL="2057400" indent="-228600" algn="l" defTabSz="914400" rtl="0" eaLnBrk="1" latinLnBrk="0" hangingPunct="1">
-              <a:lnSpc>
-                <a:spcPct val="90000"/>
-              </a:lnSpc>
-              <a:spcBef>
-                <a:spcPts val="500"/>
-              </a:spcBef>
-              <a:buFont typeface="Arial" panose="020B0604020202020204" pitchFamily="34" charset="0"/>
-              <a:buChar char="•"/>
-              <a:defRPr sz="1800" kern="1200">
-                <a:solidFill>
-                  <a:schemeClr val="tx1"/>
-                </a:solidFill>
-                <a:latin typeface="+mn-lt"/>
-                <a:ea typeface="+mn-ea"/>
-                <a:cs typeface="+mn-cs"/>
-              </a:defRPr>
-            </a:lvl5pPr>
-            <a:lvl6pPr marL="2514600" indent="-228600" algn="l" defTabSz="914400" rtl="0" eaLnBrk="1" latinLnBrk="0" hangingPunct="1">
-              <a:lnSpc>
-                <a:spcPct val="90000"/>
-              </a:lnSpc>
-              <a:spcBef>
-                <a:spcPts val="500"/>
-              </a:spcBef>
-              <a:buFont typeface="Arial" panose="020B0604020202020204" pitchFamily="34" charset="0"/>
-              <a:buChar char="•"/>
-              <a:defRPr sz="1800" kern="1200">
-                <a:solidFill>
-                  <a:schemeClr val="tx1"/>
-                </a:solidFill>
-                <a:latin typeface="+mn-lt"/>
-                <a:ea typeface="+mn-ea"/>
-                <a:cs typeface="+mn-cs"/>
-              </a:defRPr>
-            </a:lvl6pPr>
-            <a:lvl7pPr marL="2971800" indent="-228600" algn="l" defTabSz="914400" rtl="0" eaLnBrk="1" latinLnBrk="0" hangingPunct="1">
-              <a:lnSpc>
-                <a:spcPct val="90000"/>
-              </a:lnSpc>
-              <a:spcBef>
-                <a:spcPts val="500"/>
-              </a:spcBef>
-              <a:buFont typeface="Arial" panose="020B0604020202020204" pitchFamily="34" charset="0"/>
-              <a:buChar char="•"/>
-              <a:defRPr sz="1800" kern="1200">
-                <a:solidFill>
-                  <a:schemeClr val="tx1"/>
-                </a:solidFill>
-                <a:latin typeface="+mn-lt"/>
-                <a:ea typeface="+mn-ea"/>
-                <a:cs typeface="+mn-cs"/>
-              </a:defRPr>
-            </a:lvl7pPr>
-            <a:lvl8pPr marL="3429000" indent="-228600" algn="l" defTabSz="914400" rtl="0" eaLnBrk="1" latinLnBrk="0" hangingPunct="1">
-              <a:lnSpc>
-                <a:spcPct val="90000"/>
-              </a:lnSpc>
-              <a:spcBef>
-                <a:spcPts val="500"/>
-              </a:spcBef>
-              <a:buFont typeface="Arial" panose="020B0604020202020204" pitchFamily="34" charset="0"/>
-              <a:buChar char="•"/>
-              <a:defRPr sz="1800" kern="1200">
-                <a:solidFill>
-                  <a:schemeClr val="tx1"/>
-                </a:solidFill>
-                <a:latin typeface="+mn-lt"/>
-                <a:ea typeface="+mn-ea"/>
-                <a:cs typeface="+mn-cs"/>
-              </a:defRPr>
-            </a:lvl8pPr>
-            <a:lvl9pPr marL="3886200" indent="-228600" algn="l" defTabSz="914400" rtl="0" eaLnBrk="1" latinLnBrk="0" hangingPunct="1">
-              <a:lnSpc>
-                <a:spcPct val="90000"/>
-              </a:lnSpc>
-              <a:spcBef>
-                <a:spcPts val="500"/>
-              </a:spcBef>
-              <a:buFont typeface="Arial" panose="020B0604020202020204" pitchFamily="34" charset="0"/>
-              <a:buChar char="•"/>
-              <a:defRPr sz="1800" kern="1200">
-                <a:solidFill>
-                  <a:schemeClr val="tx1"/>
-                </a:solidFill>
-                <a:latin typeface="+mn-lt"/>
-                <a:ea typeface="+mn-ea"/>
-                <a:cs typeface="+mn-cs"/>
-              </a:defRPr>
-            </a:lvl9pPr>
-          </a:lstStyle>
-          <a:p>
-            <a:pPr marL="0" indent="0">
-              <a:lnSpc>
-                <a:spcPct val="110000"/>
-              </a:lnSpc>
-              <a:buNone/>
-            </a:pPr>
-            <a:r>
-              <a:rPr lang="en-US" altLang="en-US" sz="2300" dirty="0">
-                <a:ea typeface="ＭＳ Ｐゴシック" panose="020B0600070205080204" pitchFamily="34" charset="-128"/>
-              </a:rPr>
-              <a:t>Consider this. Why did y not change?</a:t>
-            </a:r>
-          </a:p>
-          <a:p>
-            <a:pPr marL="0" indent="0">
-              <a:buFont typeface="Arial" panose="020B0604020202020204" pitchFamily="34" charset="0"/>
-              <a:buNone/>
-            </a:pPr>
-            <a:endParaRPr lang="en-US" altLang="en-US" sz="2400" dirty="0">
-              <a:solidFill>
-                <a:srgbClr val="660033"/>
-              </a:solidFill>
-              <a:latin typeface="Courier New" panose="02070309020205020404" pitchFamily="49" charset="0"/>
-              <a:ea typeface="ＭＳ Ｐゴシック" panose="020B0600070205080204" pitchFamily="34" charset="-128"/>
-            </a:endParaRPr>
-          </a:p>
-          <a:p>
-            <a:pPr marL="0" indent="0">
-              <a:spcAft>
-                <a:spcPct val="15000"/>
-              </a:spcAft>
-              <a:buNone/>
-            </a:pPr>
-            <a:r>
-              <a:rPr lang="en-US" altLang="en-US" sz="1300" dirty="0">
-                <a:solidFill>
-                  <a:schemeClr val="accent2"/>
-                </a:solidFill>
-                <a:latin typeface="Lucida Sans Typewriter" panose="020B0509030504030204" pitchFamily="49" charset="0"/>
-                <a:ea typeface="ＭＳ Ｐゴシック" panose="020B0600070205080204" pitchFamily="34" charset="-128"/>
-              </a:rPr>
-              <a:t>&gt;&gt;&gt; x = y = 1000</a:t>
-            </a:r>
-          </a:p>
-          <a:p>
-            <a:pPr marL="0" indent="0">
-              <a:spcAft>
-                <a:spcPct val="15000"/>
-              </a:spcAft>
-              <a:buNone/>
-            </a:pPr>
-            <a:r>
-              <a:rPr lang="en-US" altLang="en-US" sz="1300" dirty="0">
-                <a:solidFill>
-                  <a:schemeClr val="accent2"/>
-                </a:solidFill>
-                <a:latin typeface="Lucida Sans Typewriter" panose="020B0509030504030204" pitchFamily="49" charset="0"/>
-                <a:ea typeface="ＭＳ Ｐゴシック" panose="020B0600070205080204" pitchFamily="34" charset="-128"/>
-              </a:rPr>
-              <a:t>&gt;&gt;&gt; x is y</a:t>
-            </a:r>
-          </a:p>
-          <a:p>
-            <a:pPr marL="0" indent="0">
-              <a:spcAft>
-                <a:spcPct val="15000"/>
-              </a:spcAft>
-              <a:buNone/>
-            </a:pPr>
-            <a:r>
-              <a:rPr lang="en-US" altLang="en-US" sz="1300" dirty="0">
-                <a:solidFill>
-                  <a:schemeClr val="accent2"/>
-                </a:solidFill>
-                <a:latin typeface="Lucida Sans Typewriter" panose="020B0509030504030204" pitchFamily="49" charset="0"/>
-                <a:ea typeface="ＭＳ Ｐゴシック" panose="020B0600070205080204" pitchFamily="34" charset="-128"/>
-              </a:rPr>
-              <a:t>&gt;&gt;&gt; True</a:t>
-            </a:r>
-          </a:p>
-          <a:p>
-            <a:pPr marL="0" indent="0">
-              <a:spcAft>
-                <a:spcPct val="15000"/>
-              </a:spcAft>
-              <a:buNone/>
-            </a:pPr>
-            <a:r>
-              <a:rPr lang="en-US" altLang="en-US" sz="1300" dirty="0">
-                <a:solidFill>
-                  <a:schemeClr val="accent2"/>
-                </a:solidFill>
-                <a:latin typeface="Lucida Sans Typewriter" panose="020B0509030504030204" pitchFamily="49" charset="0"/>
-                <a:ea typeface="ＭＳ Ｐゴシック" panose="020B0600070205080204" pitchFamily="34" charset="-128"/>
-              </a:rPr>
-              <a:t>&gt;&gt;&gt; x = 2000</a:t>
-            </a:r>
-          </a:p>
-          <a:p>
-            <a:pPr marL="0" indent="0">
-              <a:spcAft>
-                <a:spcPct val="15000"/>
-              </a:spcAft>
-              <a:buNone/>
-            </a:pPr>
-            <a:r>
-              <a:rPr lang="en-US" altLang="en-US" sz="1300" dirty="0">
-                <a:solidFill>
-                  <a:schemeClr val="accent2"/>
-                </a:solidFill>
-                <a:latin typeface="Lucida Sans Typewriter" panose="020B0509030504030204" pitchFamily="49" charset="0"/>
-                <a:ea typeface="ＭＳ Ｐゴシック" panose="020B0600070205080204" pitchFamily="34" charset="-128"/>
-              </a:rPr>
-              <a:t>&gt;&gt;&gt; x</a:t>
-            </a:r>
-          </a:p>
-          <a:p>
-            <a:pPr marL="0" indent="0">
-              <a:spcAft>
-                <a:spcPct val="15000"/>
-              </a:spcAft>
-              <a:buNone/>
-            </a:pPr>
-            <a:r>
-              <a:rPr lang="en-US" altLang="en-US" sz="1300" dirty="0">
-                <a:solidFill>
-                  <a:schemeClr val="accent2"/>
-                </a:solidFill>
-                <a:latin typeface="Lucida Sans Typewriter" panose="020B0509030504030204" pitchFamily="49" charset="0"/>
-                <a:ea typeface="ＭＳ Ｐゴシック" panose="020B0600070205080204" pitchFamily="34" charset="-128"/>
-              </a:rPr>
-              <a:t>&gt;&gt;&gt; 2000</a:t>
-            </a:r>
-          </a:p>
-          <a:p>
-            <a:pPr marL="0" indent="0">
-              <a:spcAft>
-                <a:spcPct val="15000"/>
-              </a:spcAft>
-              <a:buNone/>
-            </a:pPr>
-            <a:r>
-              <a:rPr lang="en-US" altLang="en-US" sz="1300" dirty="0">
-                <a:solidFill>
-                  <a:schemeClr val="accent2"/>
-                </a:solidFill>
-                <a:latin typeface="Lucida Sans Typewriter" panose="020B0509030504030204" pitchFamily="49" charset="0"/>
-                <a:ea typeface="ＭＳ Ｐゴシック" panose="020B0600070205080204" pitchFamily="34" charset="-128"/>
-              </a:rPr>
-              <a:t>&gt;&gt;&gt; y</a:t>
-            </a:r>
-          </a:p>
-          <a:p>
-            <a:pPr marL="0" indent="0">
-              <a:spcAft>
-                <a:spcPct val="15000"/>
-              </a:spcAft>
-              <a:buNone/>
-            </a:pPr>
-            <a:r>
-              <a:rPr lang="en-US" altLang="en-US" sz="1300" dirty="0">
-                <a:solidFill>
-                  <a:schemeClr val="accent2"/>
-                </a:solidFill>
-                <a:latin typeface="Lucida Sans Typewriter" panose="020B0509030504030204" pitchFamily="49" charset="0"/>
-                <a:ea typeface="ＭＳ Ｐゴシック" panose="020B0600070205080204" pitchFamily="34" charset="-128"/>
-              </a:rPr>
-              <a:t>&gt;&gt;&gt; 1000</a:t>
             </a:r>
           </a:p>
         </p:txBody>

</xml_diff>